<commit_message>
Final edits for 09.21.21 Practicum presentation.
</commit_message>
<xml_diff>
--- a/dl_getting_started.pptx
+++ b/dl_getting_started.pptx
@@ -225,7 +225,7 @@
           <a:p>
             <a:fld id="{FD93C9B2-20F6-4DB1-B471-224337D0AC79}" type="datetimeFigureOut">
               <a:rPr lang="en-US" smtClean="0"/>
-              <a:t>9/16/2021</a:t>
+              <a:t>9/20/2021</a:t>
             </a:fld>
             <a:endParaRPr lang="en-US"/>
           </a:p>
@@ -2207,24 +2207,10 @@
                   </a:schemeClr>
                 </a:solidFill>
               </a:rPr>
-              <a:t>The second question is also important.  In fact, it is the primary focus of today’s learning experience.  It is not a question that we can fully answer for you as it requires a certain level of knowledge and imagination on your part, though we can prime your thinking by demonstrating a specific application.  That’s what you will be doing today.  You are going to write some code to build and then test a neural network capable of classifying images.  There are faculty in Dentistry who are already doing some interesting things with AI.  One of those persons is Divakar Karanth,</a:t>
-            </a:r>
-            <a:r>
-              <a:rPr lang="en-US" sz="1800" dirty="0">
-                <a:effectLst/>
-                <a:latin typeface="Calibri" panose="020F0502020204030204" pitchFamily="34" charset="0"/>
-                <a:ea typeface="Calibri" panose="020F0502020204030204" pitchFamily="34" charset="0"/>
-              </a:rPr>
-              <a:t> a clinical associate professor in orthodontics.  I also have an article for you to consider: </a:t>
-            </a:r>
-            <a:r>
-              <a:rPr lang="en-US" sz="1800" i="1" dirty="0">
-                <a:effectLst/>
-                <a:latin typeface="Calibri" panose="020F0502020204030204" pitchFamily="34" charset="0"/>
-                <a:ea typeface="Calibri" panose="020F0502020204030204" pitchFamily="34" charset="0"/>
-              </a:rPr>
-              <a:t>Artificial intelligence in dentistry: current applications and future perspectives.</a:t>
-            </a:r>
+              <a:t>The second question is also important.  In fact, it is the primary focus of today’s learning experience.  It is not a question that we can fully answer for you as it requires a certain level of knowledge and imagination on your part, though we can prime your thinking by demonstrating a specific application.  That’s what you will be doing today.  You are going to write some code to build and then test a neural network capable of classifying images. </a:t>
+            </a:r>
+          </a:p>
+          <a:p>
             <a:endParaRPr lang="en-US" sz="1100" dirty="0">
               <a:solidFill>
                 <a:schemeClr val="tx1">
@@ -2235,16 +2221,6 @@
             </a:endParaRPr>
           </a:p>
           <a:p>
-            <a:endParaRPr lang="en-US" sz="1100" dirty="0">
-              <a:solidFill>
-                <a:schemeClr val="tx1">
-                  <a:lumMod val="75000"/>
-                  <a:lumOff val="25000"/>
-                </a:schemeClr>
-              </a:solidFill>
-            </a:endParaRPr>
-          </a:p>
-          <a:p>
             <a:r>
               <a:rPr lang="en-US" sz="1100" dirty="0">
                 <a:solidFill>
@@ -2254,7 +2230,7 @@
                   </a:schemeClr>
                 </a:solidFill>
               </a:rPr>
-              <a:t>But before we do that, let’s first take a quick look at the field of AI and its two sub-disciplines.</a:t>
+              <a:t>But before we do that, let’s first take a quick look at the two essential questions which inform each learning experience in Practicum AI.</a:t>
             </a:r>
           </a:p>
           <a:p>
@@ -2363,7 +2339,7 @@
               <a:defRPr/>
             </a:pPr>
             <a:r>
-              <a:rPr lang="en-US" sz="1800" b="1" dirty="0">
+              <a:rPr lang="en-US" sz="1100" b="1" dirty="0">
                 <a:solidFill>
                   <a:srgbClr val="24292F"/>
                 </a:solidFill>
@@ -2374,7 +2350,7 @@
                     </a:srgbClr>
                   </a:outerShdw>
                 </a:effectLst>
-                <a:latin typeface="Segoe UI" panose="020B0502040204020203" pitchFamily="34" charset="0"/>
+                <a:latin typeface="+mn-lt"/>
                 <a:ea typeface="Times New Roman" panose="02020603050405020304" pitchFamily="18" charset="0"/>
               </a:rPr>
               <a:t>Focus</a:t>
@@ -2399,12 +2375,12 @@
               <a:defRPr/>
             </a:pPr>
             <a:r>
-              <a:rPr lang="en-US" sz="1800" dirty="0">
+              <a:rPr lang="en-US" sz="1100" dirty="0">
                 <a:solidFill>
                   <a:srgbClr val="24292F"/>
                 </a:solidFill>
                 <a:effectLst/>
-                <a:latin typeface="Segoe UI" panose="020B0502040204020203" pitchFamily="34" charset="0"/>
+                <a:latin typeface="+mn-lt"/>
                 <a:ea typeface="Times New Roman" panose="02020603050405020304" pitchFamily="18" charset="0"/>
               </a:rPr>
               <a:t>So often, students think they can learn AI programming while multi-tasking on Facebook or texting friends on their cell phone. After programming for 30 years, I've learned one thing. You'll learn AI much faster if you can devote focused, uninterrupted time to practice.</a:t>
@@ -2429,9 +2405,9 @@
               <a:defRPr/>
             </a:pPr>
             <a:r>
-              <a:rPr lang="en-US" sz="1800" b="1" dirty="0">
+              <a:rPr lang="en-US" sz="1100" b="1" dirty="0">
                 <a:effectLst/>
-                <a:latin typeface="LMRoman12-Bold"/>
+                <a:latin typeface="+mn-lt"/>
                 <a:ea typeface="Calibri" panose="020F0502020204030204" pitchFamily="34" charset="0"/>
                 <a:cs typeface="LMRoman12-Bold"/>
               </a:rPr>
@@ -2457,27 +2433,27 @@
               <a:defRPr/>
             </a:pPr>
             <a:r>
-              <a:rPr lang="en-US" sz="1800" dirty="0">
+              <a:rPr lang="en-US" sz="1100" dirty="0">
                 <a:effectLst/>
-                <a:latin typeface="LMRoman10-Regular"/>
+                <a:latin typeface="+mn-lt"/>
                 <a:ea typeface="Calibri" panose="020F0502020204030204" pitchFamily="34" charset="0"/>
                 <a:cs typeface="LMRoman10-Regular"/>
               </a:rPr>
               <a:t>Although copying and pasting may help you to avoid typing errors, it can also interfere with your learning</a:t>
             </a:r>
             <a:r>
-              <a:rPr lang="en-US" sz="1800" dirty="0">
+              <a:rPr lang="en-US" sz="1100" dirty="0">
                 <a:effectLst/>
-                <a:latin typeface="Calibri" panose="020F0502020204030204" pitchFamily="34" charset="0"/>
+                <a:latin typeface="+mn-lt"/>
                 <a:ea typeface="Calibri" panose="020F0502020204030204" pitchFamily="34" charset="0"/>
                 <a:cs typeface="Times New Roman" panose="02020603050405020304" pitchFamily="18" charset="0"/>
               </a:rPr>
               <a:t> </a:t>
             </a:r>
             <a:r>
-              <a:rPr lang="en-US" sz="1800" dirty="0">
+              <a:rPr lang="en-US" sz="1100" dirty="0">
                 <a:effectLst/>
-                <a:latin typeface="LMRoman10-Regular"/>
+                <a:latin typeface="+mn-lt"/>
                 <a:ea typeface="Calibri" panose="020F0502020204030204" pitchFamily="34" charset="0"/>
                 <a:cs typeface="LMRoman10-Regular"/>
               </a:rPr>
@@ -2503,63 +2479,54 @@
               <a:defRPr/>
             </a:pPr>
             <a:r>
-              <a:rPr lang="en-US" sz="1800" dirty="0">
+              <a:rPr lang="en-US" sz="1100" dirty="0">
                 <a:effectLst/>
-                <a:latin typeface="LMRoman10-Regular"/>
+                <a:latin typeface="+mn-lt"/>
                 <a:ea typeface="Calibri" panose="020F0502020204030204" pitchFamily="34" charset="0"/>
                 <a:cs typeface="Times New Roman" panose="02020603050405020304" pitchFamily="18" charset="0"/>
               </a:rPr>
-              <a:t>Typing</a:t>
-            </a:r>
-            <a:r>
-              <a:rPr lang="en-US" sz="1800" dirty="0">
+              <a:t>Typing </a:t>
+            </a:r>
+            <a:r>
+              <a:rPr lang="en-US" sz="1100" dirty="0">
                 <a:effectLst/>
-                <a:latin typeface="Calibri" panose="020F0502020204030204" pitchFamily="34" charset="0"/>
+                <a:latin typeface="+mn-lt"/>
+                <a:ea typeface="Calibri" panose="020F0502020204030204" pitchFamily="34" charset="0"/>
+                <a:cs typeface="LMRoman10-Regular"/>
+              </a:rPr>
+              <a:t>errors can help you gain experience in writing code it provides informative feedback when you</a:t>
+            </a:r>
+            <a:r>
+              <a:rPr lang="en-US" sz="1100" dirty="0">
+                <a:effectLst/>
+                <a:latin typeface="+mn-lt"/>
                 <a:ea typeface="Calibri" panose="020F0502020204030204" pitchFamily="34" charset="0"/>
                 <a:cs typeface="Times New Roman" panose="02020603050405020304" pitchFamily="18" charset="0"/>
               </a:rPr>
               <a:t> </a:t>
             </a:r>
             <a:r>
-              <a:rPr lang="en-US" sz="1800" dirty="0">
+              <a:rPr lang="en-US" sz="1100" dirty="0">
                 <a:effectLst/>
-                <a:latin typeface="LMRoman10-Regular"/>
+                <a:latin typeface="+mn-lt"/>
                 <a:ea typeface="Calibri" panose="020F0502020204030204" pitchFamily="34" charset="0"/>
                 <a:cs typeface="LMRoman10-Regular"/>
               </a:rPr>
-              <a:t>errors can help you gain experience in writing code it provides informative feedback when you</a:t>
-            </a:r>
-            <a:r>
-              <a:rPr lang="en-US" sz="1800" dirty="0">
+              <a:t>make mistakes. Making and correcting typing errors is an important skill to develop, particularly</a:t>
+            </a:r>
+            <a:r>
+              <a:rPr lang="en-US" sz="1100" dirty="0">
                 <a:effectLst/>
-                <a:latin typeface="Calibri" panose="020F0502020204030204" pitchFamily="34" charset="0"/>
+                <a:latin typeface="+mn-lt"/>
                 <a:ea typeface="Calibri" panose="020F0502020204030204" pitchFamily="34" charset="0"/>
                 <a:cs typeface="Times New Roman" panose="02020603050405020304" pitchFamily="18" charset="0"/>
               </a:rPr>
               <a:t> </a:t>
             </a:r>
             <a:r>
-              <a:rPr lang="en-US" sz="1800" dirty="0">
+              <a:rPr lang="en-US" sz="1100" dirty="0">
                 <a:effectLst/>
-                <a:latin typeface="LMRoman10-Regular"/>
-                <a:ea typeface="Calibri" panose="020F0502020204030204" pitchFamily="34" charset="0"/>
-                <a:cs typeface="LMRoman10-Regular"/>
-              </a:rPr>
-              <a:t>make mistakes. Making and correcting typing errors is an important skill to develop, particularly</a:t>
-            </a:r>
-            <a:r>
-              <a:rPr lang="en-US" sz="1800" dirty="0">
-                <a:effectLst/>
-                <a:latin typeface="Calibri" panose="020F0502020204030204" pitchFamily="34" charset="0"/>
-                <a:ea typeface="Calibri" panose="020F0502020204030204" pitchFamily="34" charset="0"/>
-                <a:cs typeface="Times New Roman" panose="02020603050405020304" pitchFamily="18" charset="0"/>
-              </a:rPr>
-              <a:t> </a:t>
-            </a:r>
-            <a:r>
-              <a:rPr lang="en-US" sz="1800" dirty="0">
-                <a:effectLst/>
-                <a:latin typeface="LMRoman10-Regular"/>
+                <a:latin typeface="+mn-lt"/>
                 <a:ea typeface="Calibri" panose="020F0502020204030204" pitchFamily="34" charset="0"/>
                 <a:cs typeface="LMRoman10-Regular"/>
               </a:rPr>
@@ -2585,54 +2552,54 @@
               <a:defRPr/>
             </a:pPr>
             <a:r>
-              <a:rPr lang="en-US" sz="1800" dirty="0">
+              <a:rPr lang="en-US" sz="1100" dirty="0">
                 <a:effectLst/>
-                <a:latin typeface="LMRoman10-Regular"/>
+                <a:latin typeface="+mn-lt"/>
                 <a:ea typeface="Calibri" panose="020F0502020204030204" pitchFamily="34" charset="0"/>
                 <a:cs typeface="Times New Roman" panose="02020603050405020304" pitchFamily="18" charset="0"/>
               </a:rPr>
               <a:t>Copying </a:t>
             </a:r>
             <a:r>
-              <a:rPr lang="en-US" sz="1800" dirty="0">
+              <a:rPr lang="en-US" sz="1100" dirty="0">
                 <a:effectLst/>
-                <a:latin typeface="LMRoman10-Regular"/>
+                <a:latin typeface="+mn-lt"/>
                 <a:ea typeface="Calibri" panose="020F0502020204030204" pitchFamily="34" charset="0"/>
                 <a:cs typeface="LMRoman10-Regular"/>
               </a:rPr>
               <a:t>and pasting code may give you the impression that you know what you are doing when – in reality – you probably do not fully understand what the individual blocks of code are actually doing.</a:t>
             </a:r>
             <a:r>
-              <a:rPr lang="en-US" sz="1800" dirty="0">
+              <a:rPr lang="en-US" sz="1100" dirty="0">
                 <a:effectLst/>
-                <a:latin typeface="Calibri" panose="020F0502020204030204" pitchFamily="34" charset="0"/>
+                <a:latin typeface="+mn-lt"/>
                 <a:ea typeface="Calibri" panose="020F0502020204030204" pitchFamily="34" charset="0"/>
                 <a:cs typeface="Times New Roman" panose="02020603050405020304" pitchFamily="18" charset="0"/>
               </a:rPr>
               <a:t> </a:t>
             </a:r>
             <a:r>
-              <a:rPr lang="en-US" sz="1800" dirty="0">
+              <a:rPr lang="en-US" sz="1100" dirty="0">
                 <a:effectLst/>
-                <a:latin typeface="LMRoman10-Regular"/>
+                <a:latin typeface="+mn-lt"/>
                 <a:ea typeface="Calibri" panose="020F0502020204030204" pitchFamily="34" charset="0"/>
                 <a:cs typeface="LMRoman10-Regular"/>
               </a:rPr>
               <a:t>Furthermore, this problem will just get worse as you deal with increasingly longer and more complicated</a:t>
             </a:r>
             <a:r>
-              <a:rPr lang="en-US" sz="1800" dirty="0">
+              <a:rPr lang="en-US" sz="1100" dirty="0">
                 <a:effectLst/>
-                <a:latin typeface="Calibri" panose="020F0502020204030204" pitchFamily="34" charset="0"/>
+                <a:latin typeface="+mn-lt"/>
                 <a:ea typeface="Calibri" panose="020F0502020204030204" pitchFamily="34" charset="0"/>
                 <a:cs typeface="Times New Roman" panose="02020603050405020304" pitchFamily="18" charset="0"/>
               </a:rPr>
               <a:t> s</a:t>
             </a:r>
             <a:r>
-              <a:rPr lang="en-US" sz="1800" dirty="0">
+              <a:rPr lang="en-US" sz="1100" dirty="0">
                 <a:effectLst/>
-                <a:latin typeface="LMRoman10-Regular"/>
+                <a:latin typeface="+mn-lt"/>
                 <a:ea typeface="Calibri" panose="020F0502020204030204" pitchFamily="34" charset="0"/>
                 <a:cs typeface="LMRoman10-Regular"/>
               </a:rPr>
@@ -2658,9 +2625,9 @@
               <a:defRPr/>
             </a:pPr>
             <a:r>
-              <a:rPr lang="en-US" sz="1800" b="1" dirty="0">
+              <a:rPr lang="en-US" sz="1100" b="1" dirty="0">
                 <a:effectLst/>
-                <a:latin typeface="LMRoman12-Bold"/>
+                <a:latin typeface="+mn-lt"/>
                 <a:ea typeface="Calibri" panose="020F0502020204030204" pitchFamily="34" charset="0"/>
                 <a:cs typeface="LMRoman12-Bold"/>
               </a:rPr>
@@ -2686,45 +2653,45 @@
               <a:defRPr/>
             </a:pPr>
             <a:r>
-              <a:rPr lang="en-US" sz="1800" dirty="0">
+              <a:rPr lang="en-US" sz="1100" dirty="0">
                 <a:effectLst/>
-                <a:latin typeface="LMRoman10-Regular"/>
+                <a:latin typeface="+mn-lt"/>
                 <a:ea typeface="Calibri" panose="020F0502020204030204" pitchFamily="34" charset="0"/>
                 <a:cs typeface="LMRoman10-Regular"/>
               </a:rPr>
               <a:t>This means running one block of code at a time and making sure that you understand why the output is what</a:t>
             </a:r>
             <a:r>
-              <a:rPr lang="en-US" sz="1800" dirty="0">
+              <a:rPr lang="en-US" sz="1100" dirty="0">
                 <a:effectLst/>
-                <a:latin typeface="Calibri" panose="020F0502020204030204" pitchFamily="34" charset="0"/>
+                <a:latin typeface="+mn-lt"/>
                 <a:ea typeface="Calibri" panose="020F0502020204030204" pitchFamily="34" charset="0"/>
                 <a:cs typeface="Times New Roman" panose="02020603050405020304" pitchFamily="18" charset="0"/>
               </a:rPr>
               <a:t> </a:t>
             </a:r>
             <a:r>
-              <a:rPr lang="en-US" sz="1800" dirty="0">
+              <a:rPr lang="en-US" sz="1100" dirty="0">
                 <a:effectLst/>
-                <a:latin typeface="LMRoman10-Regular"/>
+                <a:latin typeface="+mn-lt"/>
                 <a:ea typeface="Calibri" panose="020F0502020204030204" pitchFamily="34" charset="0"/>
                 <a:cs typeface="LMRoman10-Regular"/>
               </a:rPr>
               <a:t>it is. If things are not clear, it is important to spend more time with that piece of the code. Here are some</a:t>
             </a:r>
             <a:r>
-              <a:rPr lang="en-US" sz="1800" dirty="0">
+              <a:rPr lang="en-US" sz="1100" dirty="0">
                 <a:effectLst/>
-                <a:latin typeface="Calibri" panose="020F0502020204030204" pitchFamily="34" charset="0"/>
+                <a:latin typeface="+mn-lt"/>
                 <a:ea typeface="Calibri" panose="020F0502020204030204" pitchFamily="34" charset="0"/>
                 <a:cs typeface="Times New Roman" panose="02020603050405020304" pitchFamily="18" charset="0"/>
               </a:rPr>
               <a:t> </a:t>
             </a:r>
             <a:r>
-              <a:rPr lang="en-US" sz="1800" dirty="0">
+              <a:rPr lang="en-US" sz="1100" dirty="0">
                 <a:effectLst/>
-                <a:latin typeface="LMRoman10-Regular"/>
+                <a:latin typeface="+mn-lt"/>
                 <a:ea typeface="Calibri" panose="020F0502020204030204" pitchFamily="34" charset="0"/>
                 <a:cs typeface="LMRoman10-Regular"/>
               </a:rPr>
@@ -2750,17 +2717,17 @@
               <a:defRPr/>
             </a:pPr>
             <a:r>
-              <a:rPr lang="en-US" sz="1800" dirty="0">
+              <a:rPr lang="en-US" sz="1100" dirty="0">
                 <a:effectLst/>
-                <a:latin typeface="LMRoman10-Regular"/>
+                <a:latin typeface="+mn-lt"/>
                 <a:ea typeface="Calibri" panose="020F0502020204030204" pitchFamily="34" charset="0"/>
                 <a:cs typeface="LMRoman10-Regular"/>
               </a:rPr>
               <a:t>Break a line of code into its components and try to understand the individual pieces.  Sometimes functions are nested within functions.</a:t>
             </a:r>
-            <a:endParaRPr lang="en-US" sz="1800" dirty="0">
+            <a:endParaRPr lang="en-US" sz="1100" dirty="0">
               <a:effectLst/>
-              <a:latin typeface="Calibri" panose="020F0502020204030204" pitchFamily="34" charset="0"/>
+              <a:latin typeface="+mn-lt"/>
               <a:ea typeface="Calibri" panose="020F0502020204030204" pitchFamily="34" charset="0"/>
               <a:cs typeface="Times New Roman" panose="02020603050405020304" pitchFamily="18" charset="0"/>
             </a:endParaRPr>
@@ -2784,16 +2751,16 @@
               <a:defRPr/>
             </a:pPr>
             <a:r>
-              <a:rPr lang="en-US" sz="1800" dirty="0">
+              <a:rPr lang="en-US" sz="1100" dirty="0">
                 <a:effectLst/>
-                <a:latin typeface="LMRoman10-Regular"/>
+                <a:latin typeface="+mn-lt"/>
                 <a:ea typeface="Calibri" panose="020F0502020204030204" pitchFamily="34" charset="0"/>
                 <a:cs typeface="LMRoman10-Regular"/>
               </a:rPr>
               <a:t>Document what each block is doing. Clear documentation is critical as you may not remember what you did when you come back to a piece of code at some point in the future. As a wise programmer once said, “Write code for the future you.” Documentation is also useful when you want to adapt or reuse code in some other way. In situations like this, you will immediately know what a specific chunk of code does because it has been clearly documented.  </a:t>
             </a:r>
             <a:r>
-              <a:rPr lang="en-US" sz="1800" b="1" dirty="0">
+              <a:rPr lang="en-US" sz="1100" b="1" dirty="0">
                 <a:solidFill>
                   <a:schemeClr val="tx1">
                     <a:lumMod val="75000"/>
@@ -2801,24 +2768,24 @@
                   </a:schemeClr>
                 </a:solidFill>
                 <a:effectLst/>
-                <a:latin typeface="LMRoman10-Regular"/>
+                <a:latin typeface="+mn-lt"/>
                 <a:ea typeface="Calibri" panose="020F0502020204030204" pitchFamily="34" charset="0"/>
                 <a:cs typeface="LMRoman10-Regular"/>
               </a:rPr>
               <a:t>Donald Knuth </a:t>
             </a:r>
             <a:r>
-              <a:rPr lang="en-US" sz="1800" dirty="0">
+              <a:rPr lang="en-US" sz="1100" dirty="0">
                 <a:effectLst/>
-                <a:latin typeface="LMRoman10-Regular"/>
+                <a:latin typeface="+mn-lt"/>
                 <a:ea typeface="Calibri" panose="020F0502020204030204" pitchFamily="34" charset="0"/>
                 <a:cs typeface="LMRoman10-Regular"/>
               </a:rPr>
               <a:t>– Literate Programming</a:t>
             </a:r>
-            <a:endParaRPr lang="en-US" sz="1800" dirty="0">
+            <a:endParaRPr lang="en-US" sz="1100" dirty="0">
               <a:effectLst/>
-              <a:latin typeface="Calibri" panose="020F0502020204030204" pitchFamily="34" charset="0"/>
+              <a:latin typeface="+mn-lt"/>
               <a:ea typeface="Calibri" panose="020F0502020204030204" pitchFamily="34" charset="0"/>
               <a:cs typeface="Times New Roman" panose="02020603050405020304" pitchFamily="18" charset="0"/>
             </a:endParaRPr>
@@ -2842,17 +2809,17 @@
               <a:defRPr/>
             </a:pPr>
             <a:r>
-              <a:rPr lang="en-US" sz="1800" dirty="0">
+              <a:rPr lang="en-US" sz="1100" dirty="0">
                 <a:effectLst/>
-                <a:latin typeface="LMRoman10-Regular"/>
+                <a:latin typeface="+mn-lt"/>
                 <a:ea typeface="Calibri" panose="020F0502020204030204" pitchFamily="34" charset="0"/>
                 <a:cs typeface="LMRoman10-Regular"/>
               </a:rPr>
               <a:t>Perform mini experiments: create a simpler example in which you can tinker with the code and see what happens to the output.</a:t>
             </a:r>
-            <a:endParaRPr lang="en-US" sz="1800" dirty="0">
+            <a:endParaRPr lang="en-US" sz="1100" dirty="0">
               <a:effectLst/>
-              <a:latin typeface="Calibri" panose="020F0502020204030204" pitchFamily="34" charset="0"/>
+              <a:latin typeface="+mn-lt"/>
               <a:ea typeface="Calibri" panose="020F0502020204030204" pitchFamily="34" charset="0"/>
               <a:cs typeface="Times New Roman" panose="02020603050405020304" pitchFamily="18" charset="0"/>
             </a:endParaRPr>
@@ -2876,9 +2843,9 @@
               <a:defRPr/>
             </a:pPr>
             <a:r>
-              <a:rPr lang="en-US" sz="1800" b="1" dirty="0">
+              <a:rPr lang="en-US" sz="1100" b="1" dirty="0">
                 <a:effectLst/>
-                <a:latin typeface="LMRoman12-Bold"/>
+                <a:latin typeface="+mn-lt"/>
                 <a:ea typeface="Calibri" panose="020F0502020204030204" pitchFamily="34" charset="0"/>
                 <a:cs typeface="LMRoman12-Bold"/>
               </a:rPr>
@@ -2904,117 +2871,117 @@
               <a:defRPr/>
             </a:pPr>
             <a:r>
-              <a:rPr lang="en-US" sz="1800" dirty="0">
+              <a:rPr lang="en-US" sz="1100" dirty="0">
                 <a:effectLst/>
-                <a:latin typeface="LMRoman10-Regular"/>
+                <a:latin typeface="+mn-lt"/>
                 <a:ea typeface="Calibri" panose="020F0502020204030204" pitchFamily="34" charset="0"/>
                 <a:cs typeface="LMRoman10-Regular"/>
               </a:rPr>
               <a:t>Everybody (from novice to more experienced users) relies on the internet when they don’t understand</a:t>
             </a:r>
             <a:r>
-              <a:rPr lang="en-US" sz="1800" dirty="0">
+              <a:rPr lang="en-US" sz="1100" dirty="0">
                 <a:effectLst/>
-                <a:latin typeface="Calibri" panose="020F0502020204030204" pitchFamily="34" charset="0"/>
+                <a:latin typeface="+mn-lt"/>
                 <a:ea typeface="Calibri" panose="020F0502020204030204" pitchFamily="34" charset="0"/>
                 <a:cs typeface="Times New Roman" panose="02020603050405020304" pitchFamily="18" charset="0"/>
               </a:rPr>
               <a:t> </a:t>
             </a:r>
             <a:r>
-              <a:rPr lang="en-US" sz="1800" dirty="0">
+              <a:rPr lang="en-US" sz="1100" dirty="0">
                 <a:effectLst/>
-                <a:latin typeface="LMRoman10-Regular"/>
+                <a:latin typeface="+mn-lt"/>
                 <a:ea typeface="Calibri" panose="020F0502020204030204" pitchFamily="34" charset="0"/>
                 <a:cs typeface="LMRoman10-Regular"/>
               </a:rPr>
               <a:t>something. It is likely that other people have already asked (and received useful answers) for the problem</a:t>
             </a:r>
             <a:r>
-              <a:rPr lang="en-US" sz="1800" dirty="0">
+              <a:rPr lang="en-US" sz="1100" dirty="0">
                 <a:effectLst/>
-                <a:latin typeface="Calibri" panose="020F0502020204030204" pitchFamily="34" charset="0"/>
+                <a:latin typeface="+mn-lt"/>
                 <a:ea typeface="Calibri" panose="020F0502020204030204" pitchFamily="34" charset="0"/>
                 <a:cs typeface="Times New Roman" panose="02020603050405020304" pitchFamily="18" charset="0"/>
               </a:rPr>
               <a:t> </a:t>
             </a:r>
             <a:r>
-              <a:rPr lang="en-US" sz="1800" dirty="0">
+              <a:rPr lang="en-US" sz="1100" dirty="0">
                 <a:effectLst/>
-                <a:latin typeface="LMRoman10-Regular"/>
+                <a:latin typeface="+mn-lt"/>
                 <a:ea typeface="Calibri" panose="020F0502020204030204" pitchFamily="34" charset="0"/>
                 <a:cs typeface="LMRoman10-Regular"/>
               </a:rPr>
               <a:t>that you are facing. However, finding the exact piece of information that you need might be hard, especially</a:t>
             </a:r>
             <a:r>
-              <a:rPr lang="en-US" sz="1800" dirty="0">
+              <a:rPr lang="en-US" sz="1100" dirty="0">
                 <a:effectLst/>
-                <a:latin typeface="Calibri" panose="020F0502020204030204" pitchFamily="34" charset="0"/>
+                <a:latin typeface="+mn-lt"/>
                 <a:ea typeface="Calibri" panose="020F0502020204030204" pitchFamily="34" charset="0"/>
                 <a:cs typeface="Times New Roman" panose="02020603050405020304" pitchFamily="18" charset="0"/>
               </a:rPr>
               <a:t> </a:t>
             </a:r>
             <a:r>
-              <a:rPr lang="en-US" sz="1800" dirty="0">
+              <a:rPr lang="en-US" sz="1100" dirty="0">
                 <a:effectLst/>
-                <a:latin typeface="LMRoman10-Regular"/>
+                <a:latin typeface="+mn-lt"/>
                 <a:ea typeface="Calibri" panose="020F0502020204030204" pitchFamily="34" charset="0"/>
                 <a:cs typeface="LMRoman10-Regular"/>
               </a:rPr>
               <a:t>if you don’t use the correct terms/key words. Learning how to search for the information that you need is</a:t>
             </a:r>
             <a:r>
-              <a:rPr lang="en-US" sz="1800" dirty="0">
+              <a:rPr lang="en-US" sz="1100" dirty="0">
                 <a:effectLst/>
-                <a:latin typeface="Calibri" panose="020F0502020204030204" pitchFamily="34" charset="0"/>
+                <a:latin typeface="+mn-lt"/>
                 <a:ea typeface="Calibri" panose="020F0502020204030204" pitchFamily="34" charset="0"/>
                 <a:cs typeface="Times New Roman" panose="02020603050405020304" pitchFamily="18" charset="0"/>
               </a:rPr>
               <a:t> </a:t>
             </a:r>
             <a:r>
-              <a:rPr lang="en-US" sz="1800" dirty="0">
+              <a:rPr lang="en-US" sz="1100" dirty="0">
                 <a:effectLst/>
-                <a:latin typeface="LMRoman10-Regular"/>
+                <a:latin typeface="+mn-lt"/>
                 <a:ea typeface="Calibri" panose="020F0502020204030204" pitchFamily="34" charset="0"/>
                 <a:cs typeface="LMRoman10-Regular"/>
               </a:rPr>
               <a:t>a skill that also takes practice. “</a:t>
             </a:r>
             <a:r>
-              <a:rPr lang="en-US" sz="1800" dirty="0" err="1">
+              <a:rPr lang="en-US" sz="1100" dirty="0" err="1">
                 <a:effectLst/>
-                <a:latin typeface="LMRoman10-Regular"/>
+                <a:latin typeface="+mn-lt"/>
                 <a:ea typeface="Calibri" panose="020F0502020204030204" pitchFamily="34" charset="0"/>
                 <a:cs typeface="LMRoman10-Regular"/>
               </a:rPr>
               <a:t>Stackoverflow</a:t>
             </a:r>
             <a:r>
-              <a:rPr lang="en-US" sz="1800" dirty="0">
+              <a:rPr lang="en-US" sz="1100" dirty="0">
                 <a:effectLst/>
-                <a:latin typeface="LMRoman10-Regular"/>
+                <a:latin typeface="+mn-lt"/>
                 <a:ea typeface="Calibri" panose="020F0502020204030204" pitchFamily="34" charset="0"/>
                 <a:cs typeface="LMRoman10-Regular"/>
               </a:rPr>
               <a:t>” and existing </a:t>
             </a:r>
             <a:r>
-              <a:rPr lang="en-US" sz="1800" dirty="0" err="1">
+              <a:rPr lang="en-US" sz="1100" dirty="0" err="1">
                 <a:effectLst/>
-                <a:latin typeface="LMRoman10-Regular"/>
+                <a:latin typeface="+mn-lt"/>
                 <a:ea typeface="Calibri" panose="020F0502020204030204" pitchFamily="34" charset="0"/>
                 <a:cs typeface="LMRoman10-Regular"/>
               </a:rPr>
               <a:t>cheatsheets</a:t>
             </a:r>
             <a:r>
-              <a:rPr lang="en-US" sz="1800" dirty="0">
+              <a:rPr lang="en-US" sz="1100" dirty="0">
                 <a:effectLst/>
-                <a:latin typeface="LMRoman10-Regular"/>
+                <a:latin typeface="+mn-lt"/>
                 <a:ea typeface="Calibri" panose="020F0502020204030204" pitchFamily="34" charset="0"/>
                 <a:cs typeface="LMRoman10-Regular"/>
               </a:rPr>
@@ -3040,9 +3007,9 @@
               <a:defRPr/>
             </a:pPr>
             <a:r>
-              <a:rPr lang="en-US" sz="1800" b="1" dirty="0">
+              <a:rPr lang="en-US" sz="1100" b="1" dirty="0">
                 <a:effectLst/>
-                <a:latin typeface="LMRoman10-Regular"/>
+                <a:latin typeface="+mn-lt"/>
                 <a:ea typeface="Calibri" panose="020F0502020204030204" pitchFamily="34" charset="0"/>
                 <a:cs typeface="LMRoman10-Regular"/>
               </a:rPr>
@@ -3068,9 +3035,9 @@
               <a:defRPr/>
             </a:pPr>
             <a:r>
-              <a:rPr lang="en-US" sz="1800" b="0" dirty="0">
+              <a:rPr lang="en-US" sz="1100" b="0" dirty="0">
                 <a:effectLst/>
-                <a:latin typeface="LMRoman10-Regular"/>
+                <a:latin typeface="+mn-lt"/>
                 <a:ea typeface="Calibri" panose="020F0502020204030204" pitchFamily="34" charset="0"/>
                 <a:cs typeface="LMRoman10-Regular"/>
               </a:rPr>
@@ -3096,20 +3063,14 @@
               <a:defRPr/>
             </a:pPr>
             <a:r>
-              <a:rPr lang="en-US" sz="1800" b="1" dirty="0">
+              <a:rPr lang="en-US" sz="1100" b="1" dirty="0">
                 <a:effectLst/>
-                <a:latin typeface="LMRoman12-Bold"/>
+                <a:latin typeface="+mn-lt"/>
                 <a:ea typeface="Calibri" panose="020F0502020204030204" pitchFamily="34" charset="0"/>
                 <a:cs typeface="LMRoman12-Bold"/>
               </a:rPr>
               <a:t>Take your time</a:t>
             </a:r>
-            <a:endParaRPr lang="en-US" sz="1800" b="1" dirty="0">
-              <a:effectLst/>
-              <a:latin typeface="LMRoman10-Regular"/>
-              <a:ea typeface="Calibri" panose="020F0502020204030204" pitchFamily="34" charset="0"/>
-              <a:cs typeface="LMRoman12-Bold"/>
-            </a:endParaRPr>
           </a:p>
           <a:p>
             <a:pPr marL="800100" marR="0" lvl="1" indent="-342900" algn="l" defTabSz="914400" rtl="0" eaLnBrk="1" fontAlgn="auto" latinLnBrk="0" hangingPunct="1">
@@ -3130,71 +3091,71 @@
               <a:defRPr/>
             </a:pPr>
             <a:r>
-              <a:rPr lang="en-US" sz="1800" dirty="0">
+              <a:rPr lang="en-US" sz="1100" dirty="0">
                 <a:effectLst/>
-                <a:latin typeface="LMRoman10-Regular"/>
+                <a:latin typeface="+mn-lt"/>
                 <a:ea typeface="Calibri" panose="020F0502020204030204" pitchFamily="34" charset="0"/>
                 <a:cs typeface="LMRoman10-Regular"/>
               </a:rPr>
               <a:t>It is important to realize that it takes time to learn AI. What this implies is that you should not</a:t>
             </a:r>
             <a:r>
-              <a:rPr lang="en-US" sz="1800" dirty="0">
+              <a:rPr lang="en-US" sz="1100" dirty="0">
                 <a:effectLst/>
-                <a:latin typeface="Calibri" panose="020F0502020204030204" pitchFamily="34" charset="0"/>
+                <a:latin typeface="+mn-lt"/>
                 <a:ea typeface="Calibri" panose="020F0502020204030204" pitchFamily="34" charset="0"/>
                 <a:cs typeface="Times New Roman" panose="02020603050405020304" pitchFamily="18" charset="0"/>
               </a:rPr>
               <a:t> </a:t>
             </a:r>
             <a:r>
-              <a:rPr lang="en-US" sz="1800" dirty="0">
+              <a:rPr lang="en-US" sz="1100" dirty="0">
                 <a:effectLst/>
-                <a:latin typeface="LMRoman10-Regular"/>
+                <a:latin typeface="+mn-lt"/>
                 <a:ea typeface="Calibri" panose="020F0502020204030204" pitchFamily="34" charset="0"/>
                 <a:cs typeface="LMRoman10-Regular"/>
               </a:rPr>
               <a:t>rush to get things done if you want to master this skill. In particular, everybody goes through some level of</a:t>
             </a:r>
             <a:r>
-              <a:rPr lang="en-US" sz="1800" dirty="0">
+              <a:rPr lang="en-US" sz="1100" dirty="0">
                 <a:effectLst/>
-                <a:latin typeface="Calibri" panose="020F0502020204030204" pitchFamily="34" charset="0"/>
+                <a:latin typeface="+mn-lt"/>
                 <a:ea typeface="Calibri" panose="020F0502020204030204" pitchFamily="34" charset="0"/>
                 <a:cs typeface="Times New Roman" panose="02020603050405020304" pitchFamily="18" charset="0"/>
               </a:rPr>
               <a:t> </a:t>
             </a:r>
             <a:r>
-              <a:rPr lang="en-US" sz="1800" dirty="0">
+              <a:rPr lang="en-US" sz="1100" dirty="0">
                 <a:effectLst/>
-                <a:latin typeface="LMRoman10-Regular"/>
+                <a:latin typeface="+mn-lt"/>
                 <a:ea typeface="Calibri" panose="020F0502020204030204" pitchFamily="34" charset="0"/>
                 <a:cs typeface="LMRoman10-Regular"/>
               </a:rPr>
               <a:t>struggle and frustration when learning AI. However, once you have mastered it, you will be amazed</a:t>
             </a:r>
             <a:r>
-              <a:rPr lang="en-US" sz="1800" dirty="0">
+              <a:rPr lang="en-US" sz="1100" dirty="0">
                 <a:effectLst/>
-                <a:latin typeface="Calibri" panose="020F0502020204030204" pitchFamily="34" charset="0"/>
+                <a:latin typeface="+mn-lt"/>
                 <a:ea typeface="Calibri" panose="020F0502020204030204" pitchFamily="34" charset="0"/>
                 <a:cs typeface="Times New Roman" panose="02020603050405020304" pitchFamily="18" charset="0"/>
               </a:rPr>
               <a:t> </a:t>
             </a:r>
             <a:r>
-              <a:rPr lang="en-US" sz="1800" dirty="0">
+              <a:rPr lang="en-US" sz="1100" dirty="0">
                 <a:effectLst/>
-                <a:latin typeface="LMRoman10-Regular"/>
+                <a:latin typeface="+mn-lt"/>
                 <a:ea typeface="Calibri" panose="020F0502020204030204" pitchFamily="34" charset="0"/>
                 <a:cs typeface="LMRoman10-Regular"/>
               </a:rPr>
               <a:t>by what this skill can do for you.</a:t>
             </a:r>
-            <a:endParaRPr lang="en-US" sz="1800" dirty="0">
+            <a:endParaRPr lang="en-US" sz="1100" dirty="0">
               <a:effectLst/>
-              <a:latin typeface="Calibri" panose="020F0502020204030204" pitchFamily="34" charset="0"/>
+              <a:latin typeface="+mn-lt"/>
               <a:ea typeface="Calibri" panose="020F0502020204030204" pitchFamily="34" charset="0"/>
               <a:cs typeface="Times New Roman" panose="02020603050405020304" pitchFamily="18" charset="0"/>
             </a:endParaRPr>
@@ -3904,7 +3865,7 @@
           <a:p>
             <a:fld id="{C3F78080-8D0A-4BE8-A5B4-CB115102D524}" type="datetimeFigureOut">
               <a:rPr lang="en-US" smtClean="0"/>
-              <a:t>9/16/2021</a:t>
+              <a:t>9/20/2021</a:t>
             </a:fld>
             <a:endParaRPr lang="en-US"/>
           </a:p>
@@ -4102,7 +4063,7 @@
           <a:p>
             <a:fld id="{C3F78080-8D0A-4BE8-A5B4-CB115102D524}" type="datetimeFigureOut">
               <a:rPr lang="en-US" smtClean="0"/>
-              <a:t>9/16/2021</a:t>
+              <a:t>9/20/2021</a:t>
             </a:fld>
             <a:endParaRPr lang="en-US"/>
           </a:p>
@@ -4310,7 +4271,7 @@
           <a:p>
             <a:fld id="{C3F78080-8D0A-4BE8-A5B4-CB115102D524}" type="datetimeFigureOut">
               <a:rPr lang="en-US" smtClean="0"/>
-              <a:t>9/16/2021</a:t>
+              <a:t>9/20/2021</a:t>
             </a:fld>
             <a:endParaRPr lang="en-US"/>
           </a:p>
@@ -4508,7 +4469,7 @@
           <a:p>
             <a:fld id="{C3F78080-8D0A-4BE8-A5B4-CB115102D524}" type="datetimeFigureOut">
               <a:rPr lang="en-US" smtClean="0"/>
-              <a:t>9/16/2021</a:t>
+              <a:t>9/20/2021</a:t>
             </a:fld>
             <a:endParaRPr lang="en-US"/>
           </a:p>
@@ -4783,7 +4744,7 @@
           <a:p>
             <a:fld id="{C3F78080-8D0A-4BE8-A5B4-CB115102D524}" type="datetimeFigureOut">
               <a:rPr lang="en-US" smtClean="0"/>
-              <a:t>9/16/2021</a:t>
+              <a:t>9/20/2021</a:t>
             </a:fld>
             <a:endParaRPr lang="en-US"/>
           </a:p>
@@ -5048,7 +5009,7 @@
           <a:p>
             <a:fld id="{C3F78080-8D0A-4BE8-A5B4-CB115102D524}" type="datetimeFigureOut">
               <a:rPr lang="en-US" smtClean="0"/>
-              <a:t>9/16/2021</a:t>
+              <a:t>9/20/2021</a:t>
             </a:fld>
             <a:endParaRPr lang="en-US"/>
           </a:p>
@@ -5460,7 +5421,7 @@
           <a:p>
             <a:fld id="{C3F78080-8D0A-4BE8-A5B4-CB115102D524}" type="datetimeFigureOut">
               <a:rPr lang="en-US" smtClean="0"/>
-              <a:t>9/16/2021</a:t>
+              <a:t>9/20/2021</a:t>
             </a:fld>
             <a:endParaRPr lang="en-US"/>
           </a:p>
@@ -5601,7 +5562,7 @@
           <a:p>
             <a:fld id="{C3F78080-8D0A-4BE8-A5B4-CB115102D524}" type="datetimeFigureOut">
               <a:rPr lang="en-US" smtClean="0"/>
-              <a:t>9/16/2021</a:t>
+              <a:t>9/20/2021</a:t>
             </a:fld>
             <a:endParaRPr lang="en-US"/>
           </a:p>
@@ -5714,7 +5675,7 @@
           <a:p>
             <a:fld id="{C3F78080-8D0A-4BE8-A5B4-CB115102D524}" type="datetimeFigureOut">
               <a:rPr lang="en-US" smtClean="0"/>
-              <a:t>9/16/2021</a:t>
+              <a:t>9/20/2021</a:t>
             </a:fld>
             <a:endParaRPr lang="en-US"/>
           </a:p>
@@ -6025,7 +5986,7 @@
           <a:p>
             <a:fld id="{C3F78080-8D0A-4BE8-A5B4-CB115102D524}" type="datetimeFigureOut">
               <a:rPr lang="en-US" smtClean="0"/>
-              <a:t>9/16/2021</a:t>
+              <a:t>9/20/2021</a:t>
             </a:fld>
             <a:endParaRPr lang="en-US"/>
           </a:p>
@@ -6313,7 +6274,7 @@
           <a:p>
             <a:fld id="{C3F78080-8D0A-4BE8-A5B4-CB115102D524}" type="datetimeFigureOut">
               <a:rPr lang="en-US" smtClean="0"/>
-              <a:t>9/16/2021</a:t>
+              <a:t>9/20/2021</a:t>
             </a:fld>
             <a:endParaRPr lang="en-US"/>
           </a:p>
@@ -6554,7 +6515,7 @@
           <a:p>
             <a:fld id="{C3F78080-8D0A-4BE8-A5B4-CB115102D524}" type="datetimeFigureOut">
               <a:rPr lang="en-US" smtClean="0"/>
-              <a:t>9/16/2021</a:t>
+              <a:t>9/20/2021</a:t>
             </a:fld>
             <a:endParaRPr lang="en-US"/>
           </a:p>

</xml_diff>